<commit_message>
Add test files and update documentation
- Added test_with_comments.pptx for testing comment functionality
- Added test_notes_mapping.py for debugging notes-slide mapping
- Updated test_complex.pptx with proper notes structure
- Updated README_ja.md with latest documentation
- Minor updates to enhanced_table_extractor.py and text_formatting_analyzer.py
</commit_message>
<xml_diff>
--- a/tests/test_files/test_complex.pptx
+++ b/tests/test_files/test_complex.pptx
@@ -4,10 +4,14 @@
   <p:sldMasterIdLst>
     <p:sldMasterId id="2147483648" r:id="rId1"/>
   </p:sldMasterIdLst>
+  <p:notesMasterIdLst>
+    <p:notesMasterId r:id="rId6"/>
+  </p:notesMasterIdLst>
   <p:sldIdLst>
     <p:sldId id="256" r:id="rId2"/>
     <p:sldId id="257" r:id="rId3"/>
     <p:sldId id="258" r:id="rId4"/>
+    <p:sldId id="259" r:id="rId5"/>
   </p:sldIdLst>
   <p:sldSz cx="9144000" cy="6858000" type="screen4x3"/>
   <p:notesSz cx="6858000" cy="9144000"/>
@@ -122,6 +126,7 @@
         <p14:section name="複雑な書式" id="{2F0C431E-8C0E-4B77-970A-AA123AE3692E}">
           <p14:sldIdLst>
             <p14:sldId id="258"/>
+            <p14:sldId id="259"/>
           </p14:sldIdLst>
         </p14:section>
       </p14:sectionLst>
@@ -142,6 +147,617 @@
     </p:ext>
   </p:extLst>
 </p:presentation>
+</file>
+
+<file path=ppt/notesMasters/notesMaster1.xml><?xml version="1.0" encoding="utf-8"?>
+<p:notesMaster xmlns:a="http://schemas.openxmlformats.org/drawingml/2006/main" xmlns:r="http://schemas.openxmlformats.org/officeDocument/2006/relationships" xmlns:p="http://schemas.openxmlformats.org/presentationml/2006/main">
+  <p:cSld>
+    <p:bg>
+      <p:bgRef idx="1001">
+        <a:schemeClr val="bg1"/>
+      </p:bgRef>
+    </p:bg>
+    <p:spTree>
+      <p:nvGrpSpPr>
+        <p:cNvPr id="1" name=""/>
+        <p:cNvGrpSpPr/>
+        <p:nvPr/>
+      </p:nvGrpSpPr>
+      <p:grpSpPr>
+        <a:xfrm>
+          <a:off x="0" y="0"/>
+          <a:ext cx="0" cy="0"/>
+          <a:chOff x="0" y="0"/>
+          <a:chExt cx="0" cy="0"/>
+        </a:xfrm>
+      </p:grpSpPr>
+      <p:sp>
+        <p:nvSpPr>
+          <p:cNvPr id="2" name="ヘッダー プレースホルダー 1"/>
+          <p:cNvSpPr>
+            <a:spLocks noGrp="1"/>
+          </p:cNvSpPr>
+          <p:nvPr>
+            <p:ph type="hdr" sz="quarter"/>
+          </p:nvPr>
+        </p:nvSpPr>
+        <p:spPr>
+          <a:xfrm>
+            <a:off x="0" y="0"/>
+            <a:ext cx="2971800" cy="458788"/>
+          </a:xfrm>
+          <a:prstGeom prst="rect">
+            <a:avLst/>
+          </a:prstGeom>
+        </p:spPr>
+        <p:txBody>
+          <a:bodyPr vert="horz" lIns="91440" tIns="45720" rIns="91440" bIns="45720" rtlCol="0"/>
+          <a:lstStyle>
+            <a:lvl1pPr algn="l">
+              <a:defRPr sz="1200"/>
+            </a:lvl1pPr>
+          </a:lstStyle>
+          <a:p>
+            <a:endParaRPr kumimoji="1" lang="ja-JP" altLang="en-US"/>
+          </a:p>
+        </p:txBody>
+      </p:sp>
+      <p:sp>
+        <p:nvSpPr>
+          <p:cNvPr id="3" name="日付プレースホルダー 2"/>
+          <p:cNvSpPr>
+            <a:spLocks noGrp="1"/>
+          </p:cNvSpPr>
+          <p:nvPr>
+            <p:ph type="dt" idx="1"/>
+          </p:nvPr>
+        </p:nvSpPr>
+        <p:spPr>
+          <a:xfrm>
+            <a:off x="3884613" y="0"/>
+            <a:ext cx="2971800" cy="458788"/>
+          </a:xfrm>
+          <a:prstGeom prst="rect">
+            <a:avLst/>
+          </a:prstGeom>
+        </p:spPr>
+        <p:txBody>
+          <a:bodyPr vert="horz" lIns="91440" tIns="45720" rIns="91440" bIns="45720" rtlCol="0"/>
+          <a:lstStyle>
+            <a:lvl1pPr algn="r">
+              <a:defRPr sz="1200"/>
+            </a:lvl1pPr>
+          </a:lstStyle>
+          <a:p>
+            <a:fld id="{91DC03EE-A16A-4983-AD38-60C7934E273C}" type="datetimeFigureOut">
+              <a:rPr kumimoji="1" lang="ja-JP" altLang="en-US" smtClean="0"/>
+              <a:t>2025/9/2</a:t>
+            </a:fld>
+            <a:endParaRPr kumimoji="1" lang="ja-JP" altLang="en-US"/>
+          </a:p>
+        </p:txBody>
+      </p:sp>
+      <p:sp>
+        <p:nvSpPr>
+          <p:cNvPr id="4" name="スライド イメージ プレースホルダー 3"/>
+          <p:cNvSpPr>
+            <a:spLocks noGrp="1" noRot="1" noChangeAspect="1"/>
+          </p:cNvSpPr>
+          <p:nvPr>
+            <p:ph type="sldImg" idx="2"/>
+          </p:nvPr>
+        </p:nvSpPr>
+        <p:spPr>
+          <a:xfrm>
+            <a:off x="1371600" y="1143000"/>
+            <a:ext cx="4114800" cy="3086100"/>
+          </a:xfrm>
+          <a:prstGeom prst="rect">
+            <a:avLst/>
+          </a:prstGeom>
+          <a:noFill/>
+          <a:ln w="12700">
+            <a:solidFill>
+              <a:prstClr val="black"/>
+            </a:solidFill>
+          </a:ln>
+        </p:spPr>
+        <p:txBody>
+          <a:bodyPr vert="horz" lIns="91440" tIns="45720" rIns="91440" bIns="45720" rtlCol="0" anchor="ctr"/>
+          <a:lstStyle/>
+          <a:p>
+            <a:endParaRPr lang="ja-JP" altLang="en-US"/>
+          </a:p>
+        </p:txBody>
+      </p:sp>
+      <p:sp>
+        <p:nvSpPr>
+          <p:cNvPr id="5" name="ノート プレースホルダー 4"/>
+          <p:cNvSpPr>
+            <a:spLocks noGrp="1"/>
+          </p:cNvSpPr>
+          <p:nvPr>
+            <p:ph type="body" sz="quarter" idx="3"/>
+          </p:nvPr>
+        </p:nvSpPr>
+        <p:spPr>
+          <a:xfrm>
+            <a:off x="685800" y="4400550"/>
+            <a:ext cx="5486400" cy="3600450"/>
+          </a:xfrm>
+          <a:prstGeom prst="rect">
+            <a:avLst/>
+          </a:prstGeom>
+        </p:spPr>
+        <p:txBody>
+          <a:bodyPr vert="horz" lIns="91440" tIns="45720" rIns="91440" bIns="45720" rtlCol="0"/>
+          <a:lstStyle/>
+          <a:p>
+            <a:pPr lvl="0"/>
+            <a:r>
+              <a:rPr kumimoji="1" lang="ja-JP" altLang="en-US"/>
+              <a:t>マスター テキストの書式設定</a:t>
+            </a:r>
+          </a:p>
+          <a:p>
+            <a:pPr lvl="1"/>
+            <a:r>
+              <a:rPr kumimoji="1" lang="ja-JP" altLang="en-US"/>
+              <a:t>第 </a:t>
+            </a:r>
+            <a:r>
+              <a:rPr kumimoji="1" lang="en-US" altLang="ja-JP"/>
+              <a:t>2 </a:t>
+            </a:r>
+            <a:r>
+              <a:rPr kumimoji="1" lang="ja-JP" altLang="en-US"/>
+              <a:t>レベル</a:t>
+            </a:r>
+          </a:p>
+          <a:p>
+            <a:pPr lvl="2"/>
+            <a:r>
+              <a:rPr kumimoji="1" lang="ja-JP" altLang="en-US"/>
+              <a:t>第 </a:t>
+            </a:r>
+            <a:r>
+              <a:rPr kumimoji="1" lang="en-US" altLang="ja-JP"/>
+              <a:t>3 </a:t>
+            </a:r>
+            <a:r>
+              <a:rPr kumimoji="1" lang="ja-JP" altLang="en-US"/>
+              <a:t>レベル</a:t>
+            </a:r>
+          </a:p>
+          <a:p>
+            <a:pPr lvl="3"/>
+            <a:r>
+              <a:rPr kumimoji="1" lang="ja-JP" altLang="en-US"/>
+              <a:t>第 </a:t>
+            </a:r>
+            <a:r>
+              <a:rPr kumimoji="1" lang="en-US" altLang="ja-JP"/>
+              <a:t>4 </a:t>
+            </a:r>
+            <a:r>
+              <a:rPr kumimoji="1" lang="ja-JP" altLang="en-US"/>
+              <a:t>レベル</a:t>
+            </a:r>
+          </a:p>
+          <a:p>
+            <a:pPr lvl="4"/>
+            <a:r>
+              <a:rPr kumimoji="1" lang="ja-JP" altLang="en-US"/>
+              <a:t>第 </a:t>
+            </a:r>
+            <a:r>
+              <a:rPr kumimoji="1" lang="en-US" altLang="ja-JP"/>
+              <a:t>5 </a:t>
+            </a:r>
+            <a:r>
+              <a:rPr kumimoji="1" lang="ja-JP" altLang="en-US"/>
+              <a:t>レベル</a:t>
+            </a:r>
+          </a:p>
+        </p:txBody>
+      </p:sp>
+      <p:sp>
+        <p:nvSpPr>
+          <p:cNvPr id="6" name="フッター プレースホルダー 5"/>
+          <p:cNvSpPr>
+            <a:spLocks noGrp="1"/>
+          </p:cNvSpPr>
+          <p:nvPr>
+            <p:ph type="ftr" sz="quarter" idx="4"/>
+          </p:nvPr>
+        </p:nvSpPr>
+        <p:spPr>
+          <a:xfrm>
+            <a:off x="0" y="8685213"/>
+            <a:ext cx="2971800" cy="458787"/>
+          </a:xfrm>
+          <a:prstGeom prst="rect">
+            <a:avLst/>
+          </a:prstGeom>
+        </p:spPr>
+        <p:txBody>
+          <a:bodyPr vert="horz" lIns="91440" tIns="45720" rIns="91440" bIns="45720" rtlCol="0" anchor="b"/>
+          <a:lstStyle>
+            <a:lvl1pPr algn="l">
+              <a:defRPr sz="1200"/>
+            </a:lvl1pPr>
+          </a:lstStyle>
+          <a:p>
+            <a:endParaRPr kumimoji="1" lang="ja-JP" altLang="en-US"/>
+          </a:p>
+        </p:txBody>
+      </p:sp>
+      <p:sp>
+        <p:nvSpPr>
+          <p:cNvPr id="7" name="スライド番号プレースホルダー 6"/>
+          <p:cNvSpPr>
+            <a:spLocks noGrp="1"/>
+          </p:cNvSpPr>
+          <p:nvPr>
+            <p:ph type="sldNum" sz="quarter" idx="5"/>
+          </p:nvPr>
+        </p:nvSpPr>
+        <p:spPr>
+          <a:xfrm>
+            <a:off x="3884613" y="8685213"/>
+            <a:ext cx="2971800" cy="458787"/>
+          </a:xfrm>
+          <a:prstGeom prst="rect">
+            <a:avLst/>
+          </a:prstGeom>
+        </p:spPr>
+        <p:txBody>
+          <a:bodyPr vert="horz" lIns="91440" tIns="45720" rIns="91440" bIns="45720" rtlCol="0" anchor="b"/>
+          <a:lstStyle>
+            <a:lvl1pPr algn="r">
+              <a:defRPr sz="1200"/>
+            </a:lvl1pPr>
+          </a:lstStyle>
+          <a:p>
+            <a:fld id="{EA00B331-84B6-4439-943C-4033C407041D}" type="slidenum">
+              <a:rPr kumimoji="1" lang="ja-JP" altLang="en-US" smtClean="0"/>
+              <a:t>‹#›</a:t>
+            </a:fld>
+            <a:endParaRPr kumimoji="1" lang="ja-JP" altLang="en-US"/>
+          </a:p>
+        </p:txBody>
+      </p:sp>
+    </p:spTree>
+    <p:extLst>
+      <p:ext uri="{BB962C8B-B14F-4D97-AF65-F5344CB8AC3E}">
+        <p14:creationId xmlns:p14="http://schemas.microsoft.com/office/powerpoint/2010/main" val="280665862"/>
+      </p:ext>
+    </p:extLst>
+  </p:cSld>
+  <p:clrMap bg1="lt1" tx1="dk1" bg2="lt2" tx2="dk2" accent1="accent1" accent2="accent2" accent3="accent3" accent4="accent4" accent5="accent5" accent6="accent6" hlink="hlink" folHlink="folHlink"/>
+  <p:notesStyle>
+    <a:lvl1pPr marL="0" algn="l" defTabSz="914400" rtl="0" eaLnBrk="1" latinLnBrk="0" hangingPunct="1">
+      <a:defRPr kumimoji="1" sz="1200" kern="1200">
+        <a:solidFill>
+          <a:schemeClr val="tx1"/>
+        </a:solidFill>
+        <a:latin typeface="+mn-lt"/>
+        <a:ea typeface="+mn-ea"/>
+        <a:cs typeface="+mn-cs"/>
+      </a:defRPr>
+    </a:lvl1pPr>
+    <a:lvl2pPr marL="457200" algn="l" defTabSz="914400" rtl="0" eaLnBrk="1" latinLnBrk="0" hangingPunct="1">
+      <a:defRPr kumimoji="1" sz="1200" kern="1200">
+        <a:solidFill>
+          <a:schemeClr val="tx1"/>
+        </a:solidFill>
+        <a:latin typeface="+mn-lt"/>
+        <a:ea typeface="+mn-ea"/>
+        <a:cs typeface="+mn-cs"/>
+      </a:defRPr>
+    </a:lvl2pPr>
+    <a:lvl3pPr marL="914400" algn="l" defTabSz="914400" rtl="0" eaLnBrk="1" latinLnBrk="0" hangingPunct="1">
+      <a:defRPr kumimoji="1" sz="1200" kern="1200">
+        <a:solidFill>
+          <a:schemeClr val="tx1"/>
+        </a:solidFill>
+        <a:latin typeface="+mn-lt"/>
+        <a:ea typeface="+mn-ea"/>
+        <a:cs typeface="+mn-cs"/>
+      </a:defRPr>
+    </a:lvl3pPr>
+    <a:lvl4pPr marL="1371600" algn="l" defTabSz="914400" rtl="0" eaLnBrk="1" latinLnBrk="0" hangingPunct="1">
+      <a:defRPr kumimoji="1" sz="1200" kern="1200">
+        <a:solidFill>
+          <a:schemeClr val="tx1"/>
+        </a:solidFill>
+        <a:latin typeface="+mn-lt"/>
+        <a:ea typeface="+mn-ea"/>
+        <a:cs typeface="+mn-cs"/>
+      </a:defRPr>
+    </a:lvl4pPr>
+    <a:lvl5pPr marL="1828800" algn="l" defTabSz="914400" rtl="0" eaLnBrk="1" latinLnBrk="0" hangingPunct="1">
+      <a:defRPr kumimoji="1" sz="1200" kern="1200">
+        <a:solidFill>
+          <a:schemeClr val="tx1"/>
+        </a:solidFill>
+        <a:latin typeface="+mn-lt"/>
+        <a:ea typeface="+mn-ea"/>
+        <a:cs typeface="+mn-cs"/>
+      </a:defRPr>
+    </a:lvl5pPr>
+    <a:lvl6pPr marL="2286000" algn="l" defTabSz="914400" rtl="0" eaLnBrk="1" latinLnBrk="0" hangingPunct="1">
+      <a:defRPr kumimoji="1" sz="1200" kern="1200">
+        <a:solidFill>
+          <a:schemeClr val="tx1"/>
+        </a:solidFill>
+        <a:latin typeface="+mn-lt"/>
+        <a:ea typeface="+mn-ea"/>
+        <a:cs typeface="+mn-cs"/>
+      </a:defRPr>
+    </a:lvl6pPr>
+    <a:lvl7pPr marL="2743200" algn="l" defTabSz="914400" rtl="0" eaLnBrk="1" latinLnBrk="0" hangingPunct="1">
+      <a:defRPr kumimoji="1" sz="1200" kern="1200">
+        <a:solidFill>
+          <a:schemeClr val="tx1"/>
+        </a:solidFill>
+        <a:latin typeface="+mn-lt"/>
+        <a:ea typeface="+mn-ea"/>
+        <a:cs typeface="+mn-cs"/>
+      </a:defRPr>
+    </a:lvl7pPr>
+    <a:lvl8pPr marL="3200400" algn="l" defTabSz="914400" rtl="0" eaLnBrk="1" latinLnBrk="0" hangingPunct="1">
+      <a:defRPr kumimoji="1" sz="1200" kern="1200">
+        <a:solidFill>
+          <a:schemeClr val="tx1"/>
+        </a:solidFill>
+        <a:latin typeface="+mn-lt"/>
+        <a:ea typeface="+mn-ea"/>
+        <a:cs typeface="+mn-cs"/>
+      </a:defRPr>
+    </a:lvl8pPr>
+    <a:lvl9pPr marL="3657600" algn="l" defTabSz="914400" rtl="0" eaLnBrk="1" latinLnBrk="0" hangingPunct="1">
+      <a:defRPr kumimoji="1" sz="1200" kern="1200">
+        <a:solidFill>
+          <a:schemeClr val="tx1"/>
+        </a:solidFill>
+        <a:latin typeface="+mn-lt"/>
+        <a:ea typeface="+mn-ea"/>
+        <a:cs typeface="+mn-cs"/>
+      </a:defRPr>
+    </a:lvl9pPr>
+  </p:notesStyle>
+</p:notesMaster>
+</file>
+
+<file path=ppt/notesSlides/notesSlide1.xml><?xml version="1.0" encoding="utf-8"?>
+<p:notes xmlns:a="http://schemas.openxmlformats.org/drawingml/2006/main" xmlns:r="http://schemas.openxmlformats.org/officeDocument/2006/relationships" xmlns:p="http://schemas.openxmlformats.org/presentationml/2006/main">
+  <p:cSld>
+    <p:spTree>
+      <p:nvGrpSpPr>
+        <p:cNvPr id="1" name=""/>
+        <p:cNvGrpSpPr/>
+        <p:nvPr/>
+      </p:nvGrpSpPr>
+      <p:grpSpPr>
+        <a:xfrm>
+          <a:off x="0" y="0"/>
+          <a:ext cx="0" cy="0"/>
+          <a:chOff x="0" y="0"/>
+          <a:chExt cx="0" cy="0"/>
+        </a:xfrm>
+      </p:grpSpPr>
+      <p:sp>
+        <p:nvSpPr>
+          <p:cNvPr id="2" name="スライド イメージ プレースホルダー 1"/>
+          <p:cNvSpPr>
+            <a:spLocks noGrp="1" noRot="1" noChangeAspect="1"/>
+          </p:cNvSpPr>
+          <p:nvPr>
+            <p:ph type="sldImg"/>
+          </p:nvPr>
+        </p:nvSpPr>
+        <p:spPr/>
+      </p:sp>
+      <p:sp>
+        <p:nvSpPr>
+          <p:cNvPr id="3" name="ノート プレースホルダー 2"/>
+          <p:cNvSpPr>
+            <a:spLocks noGrp="1"/>
+          </p:cNvSpPr>
+          <p:nvPr>
+            <p:ph type="body" idx="1"/>
+          </p:nvPr>
+        </p:nvSpPr>
+        <p:spPr/>
+        <p:txBody>
+          <a:bodyPr/>
+          <a:lstStyle/>
+          <a:p>
+            <a:r>
+              <a:rPr kumimoji="1" lang="ja-JP" altLang="en-US" dirty="0"/>
+              <a:t>ノート</a:t>
+            </a:r>
+            <a:r>
+              <a:rPr kumimoji="1" lang="ja-JP" altLang="en-US" b="1" dirty="0"/>
+              <a:t>にコメントも</a:t>
+            </a:r>
+            <a:r>
+              <a:rPr kumimoji="1" lang="ja-JP" altLang="en-US" dirty="0">
+                <a:highlight>
+                  <a:srgbClr val="FFFF00"/>
+                </a:highlight>
+              </a:rPr>
+              <a:t>記載</a:t>
+            </a:r>
+            <a:r>
+              <a:rPr kumimoji="1" lang="ja-JP" altLang="en-US" dirty="0"/>
+              <a:t>しました</a:t>
+            </a:r>
+          </a:p>
+        </p:txBody>
+      </p:sp>
+      <p:sp>
+        <p:nvSpPr>
+          <p:cNvPr id="4" name="スライド番号プレースホルダー 3"/>
+          <p:cNvSpPr>
+            <a:spLocks noGrp="1"/>
+          </p:cNvSpPr>
+          <p:nvPr>
+            <p:ph type="sldNum" sz="quarter" idx="5"/>
+          </p:nvPr>
+        </p:nvSpPr>
+        <p:spPr/>
+        <p:txBody>
+          <a:bodyPr/>
+          <a:lstStyle/>
+          <a:p>
+            <a:fld id="{EA00B331-84B6-4439-943C-4033C407041D}" type="slidenum">
+              <a:rPr kumimoji="1" lang="ja-JP" altLang="en-US" smtClean="0"/>
+              <a:t>3</a:t>
+            </a:fld>
+            <a:endParaRPr kumimoji="1" lang="ja-JP" altLang="en-US"/>
+          </a:p>
+        </p:txBody>
+      </p:sp>
+    </p:spTree>
+    <p:extLst>
+      <p:ext uri="{BB962C8B-B14F-4D97-AF65-F5344CB8AC3E}">
+        <p14:creationId xmlns:p14="http://schemas.microsoft.com/office/powerpoint/2010/main" val="565121400"/>
+      </p:ext>
+    </p:extLst>
+  </p:cSld>
+  <p:clrMapOvr>
+    <a:masterClrMapping/>
+  </p:clrMapOvr>
+</p:notes>
+</file>
+
+<file path=ppt/notesSlides/notesSlide2.xml><?xml version="1.0" encoding="utf-8"?>
+<p:notes xmlns:a="http://schemas.openxmlformats.org/drawingml/2006/main" xmlns:r="http://schemas.openxmlformats.org/officeDocument/2006/relationships" xmlns:p="http://schemas.openxmlformats.org/presentationml/2006/main">
+  <p:cSld>
+    <p:spTree>
+      <p:nvGrpSpPr>
+        <p:cNvPr id="1" name="">
+          <a:extLst>
+            <a:ext uri="{FF2B5EF4-FFF2-40B4-BE49-F238E27FC236}">
+              <a16:creationId xmlns:a16="http://schemas.microsoft.com/office/drawing/2014/main" id="{AF0494A1-EABE-E8BE-FC1D-CCA53DD9D69F}"/>
+            </a:ext>
+          </a:extLst>
+        </p:cNvPr>
+        <p:cNvGrpSpPr/>
+        <p:nvPr/>
+      </p:nvGrpSpPr>
+      <p:grpSpPr>
+        <a:xfrm>
+          <a:off x="0" y="0"/>
+          <a:ext cx="0" cy="0"/>
+          <a:chOff x="0" y="0"/>
+          <a:chExt cx="0" cy="0"/>
+        </a:xfrm>
+      </p:grpSpPr>
+      <p:sp>
+        <p:nvSpPr>
+          <p:cNvPr id="2" name="スライド イメージ プレースホルダー 1">
+            <a:extLst>
+              <a:ext uri="{FF2B5EF4-FFF2-40B4-BE49-F238E27FC236}">
+                <a16:creationId xmlns:a16="http://schemas.microsoft.com/office/drawing/2014/main" id="{74880F04-6BA0-9E37-A6AC-F43BD375D27B}"/>
+              </a:ext>
+            </a:extLst>
+          </p:cNvPr>
+          <p:cNvSpPr>
+            <a:spLocks noGrp="1" noRot="1" noChangeAspect="1"/>
+          </p:cNvSpPr>
+          <p:nvPr>
+            <p:ph type="sldImg"/>
+          </p:nvPr>
+        </p:nvSpPr>
+        <p:spPr/>
+      </p:sp>
+      <p:sp>
+        <p:nvSpPr>
+          <p:cNvPr id="3" name="ノート プレースホルダー 2">
+            <a:extLst>
+              <a:ext uri="{FF2B5EF4-FFF2-40B4-BE49-F238E27FC236}">
+                <a16:creationId xmlns:a16="http://schemas.microsoft.com/office/drawing/2014/main" id="{EBD7F0BB-E795-7FE8-1638-B2A9A3F8E6AF}"/>
+              </a:ext>
+            </a:extLst>
+          </p:cNvPr>
+          <p:cNvSpPr>
+            <a:spLocks noGrp="1"/>
+          </p:cNvSpPr>
+          <p:nvPr>
+            <p:ph type="body" idx="1"/>
+          </p:nvPr>
+        </p:nvSpPr>
+        <p:spPr/>
+        <p:txBody>
+          <a:bodyPr/>
+          <a:lstStyle/>
+          <a:p>
+            <a:r>
+              <a:rPr kumimoji="1" lang="ja-JP" altLang="en-US" dirty="0"/>
+              <a:t>ノート</a:t>
+            </a:r>
+            <a:r>
+              <a:rPr kumimoji="1" lang="ja-JP" altLang="en-US" b="1" dirty="0"/>
+              <a:t>にコメントも</a:t>
+            </a:r>
+            <a:r>
+              <a:rPr kumimoji="1" lang="ja-JP" altLang="en-US" dirty="0">
+                <a:highlight>
+                  <a:srgbClr val="FFFF00"/>
+                </a:highlight>
+              </a:rPr>
+              <a:t>記載</a:t>
+            </a:r>
+            <a:r>
+              <a:rPr kumimoji="1" lang="ja-JP" altLang="en-US" dirty="0"/>
+              <a:t>しました</a:t>
+            </a:r>
+          </a:p>
+        </p:txBody>
+      </p:sp>
+      <p:sp>
+        <p:nvSpPr>
+          <p:cNvPr id="4" name="スライド番号プレースホルダー 3">
+            <a:extLst>
+              <a:ext uri="{FF2B5EF4-FFF2-40B4-BE49-F238E27FC236}">
+                <a16:creationId xmlns:a16="http://schemas.microsoft.com/office/drawing/2014/main" id="{C1AE73ED-5FBE-894A-99EC-A47EBE8B71FF}"/>
+              </a:ext>
+            </a:extLst>
+          </p:cNvPr>
+          <p:cNvSpPr>
+            <a:spLocks noGrp="1"/>
+          </p:cNvSpPr>
+          <p:nvPr>
+            <p:ph type="sldNum" sz="quarter" idx="5"/>
+          </p:nvPr>
+        </p:nvSpPr>
+        <p:spPr/>
+        <p:txBody>
+          <a:bodyPr/>
+          <a:lstStyle/>
+          <a:p>
+            <a:fld id="{EA00B331-84B6-4439-943C-4033C407041D}" type="slidenum">
+              <a:rPr kumimoji="1" lang="ja-JP" altLang="en-US" smtClean="0"/>
+              <a:t>4</a:t>
+            </a:fld>
+            <a:endParaRPr kumimoji="1" lang="ja-JP" altLang="en-US"/>
+          </a:p>
+        </p:txBody>
+      </p:sp>
+    </p:spTree>
+    <p:extLst>
+      <p:ext uri="{BB962C8B-B14F-4D97-AF65-F5344CB8AC3E}">
+        <p14:creationId xmlns:p14="http://schemas.microsoft.com/office/powerpoint/2010/main" val="3122015885"/>
+      </p:ext>
+    </p:extLst>
+  </p:cSld>
+  <p:clrMapOvr>
+    <a:masterClrMapping/>
+  </p:clrMapOvr>
+</p:notes>
 </file>
 
 <file path=ppt/slideLayouts/slideLayout1.xml><?xml version="1.0" encoding="utf-8"?>
@@ -323,7 +939,7 @@
           <a:p>
             <a:fld id="{5BCAD085-E8A6-8845-BD4E-CB4CCA059FC4}" type="datetimeFigureOut">
               <a:rPr lang="en-US" smtClean="0"/>
-              <a:t>9/1/2025</a:t>
+              <a:t>9/2/2025</a:t>
             </a:fld>
             <a:endParaRPr lang="en-US"/>
           </a:p>
@@ -491,7 +1107,7 @@
           <a:p>
             <a:fld id="{5BCAD085-E8A6-8845-BD4E-CB4CCA059FC4}" type="datetimeFigureOut">
               <a:rPr lang="en-US" smtClean="0"/>
-              <a:t>9/1/2025</a:t>
+              <a:t>9/2/2025</a:t>
             </a:fld>
             <a:endParaRPr lang="en-US"/>
           </a:p>
@@ -669,7 +1285,7 @@
           <a:p>
             <a:fld id="{5BCAD085-E8A6-8845-BD4E-CB4CCA059FC4}" type="datetimeFigureOut">
               <a:rPr lang="en-US" smtClean="0"/>
-              <a:t>9/1/2025</a:t>
+              <a:t>9/2/2025</a:t>
             </a:fld>
             <a:endParaRPr lang="en-US"/>
           </a:p>
@@ -837,7 +1453,7 @@
           <a:p>
             <a:fld id="{5BCAD085-E8A6-8845-BD4E-CB4CCA059FC4}" type="datetimeFigureOut">
               <a:rPr lang="en-US" smtClean="0"/>
-              <a:t>9/1/2025</a:t>
+              <a:t>9/2/2025</a:t>
             </a:fld>
             <a:endParaRPr lang="en-US"/>
           </a:p>
@@ -1082,7 +1698,7 @@
           <a:p>
             <a:fld id="{5BCAD085-E8A6-8845-BD4E-CB4CCA059FC4}" type="datetimeFigureOut">
               <a:rPr lang="en-US" smtClean="0"/>
-              <a:t>9/1/2025</a:t>
+              <a:t>9/2/2025</a:t>
             </a:fld>
             <a:endParaRPr lang="en-US"/>
           </a:p>
@@ -1367,7 +1983,7 @@
           <a:p>
             <a:fld id="{5BCAD085-E8A6-8845-BD4E-CB4CCA059FC4}" type="datetimeFigureOut">
               <a:rPr lang="en-US" smtClean="0"/>
-              <a:t>9/1/2025</a:t>
+              <a:t>9/2/2025</a:t>
             </a:fld>
             <a:endParaRPr lang="en-US"/>
           </a:p>
@@ -1786,7 +2402,7 @@
           <a:p>
             <a:fld id="{5BCAD085-E8A6-8845-BD4E-CB4CCA059FC4}" type="datetimeFigureOut">
               <a:rPr lang="en-US" smtClean="0"/>
-              <a:t>9/1/2025</a:t>
+              <a:t>9/2/2025</a:t>
             </a:fld>
             <a:endParaRPr lang="en-US"/>
           </a:p>
@@ -1903,7 +2519,7 @@
           <a:p>
             <a:fld id="{5BCAD085-E8A6-8845-BD4E-CB4CCA059FC4}" type="datetimeFigureOut">
               <a:rPr lang="en-US" smtClean="0"/>
-              <a:t>9/1/2025</a:t>
+              <a:t>9/2/2025</a:t>
             </a:fld>
             <a:endParaRPr lang="en-US"/>
           </a:p>
@@ -1998,7 +2614,7 @@
           <a:p>
             <a:fld id="{5BCAD085-E8A6-8845-BD4E-CB4CCA059FC4}" type="datetimeFigureOut">
               <a:rPr lang="en-US" smtClean="0"/>
-              <a:t>9/1/2025</a:t>
+              <a:t>9/2/2025</a:t>
             </a:fld>
             <a:endParaRPr lang="en-US"/>
           </a:p>
@@ -2273,7 +2889,7 @@
           <a:p>
             <a:fld id="{5BCAD085-E8A6-8845-BD4E-CB4CCA059FC4}" type="datetimeFigureOut">
               <a:rPr lang="en-US" smtClean="0"/>
-              <a:t>9/1/2025</a:t>
+              <a:t>9/2/2025</a:t>
             </a:fld>
             <a:endParaRPr lang="en-US"/>
           </a:p>
@@ -2525,7 +3141,7 @@
           <a:p>
             <a:fld id="{5BCAD085-E8A6-8845-BD4E-CB4CCA059FC4}" type="datetimeFigureOut">
               <a:rPr lang="en-US" smtClean="0"/>
-              <a:t>9/1/2025</a:t>
+              <a:t>9/2/2025</a:t>
             </a:fld>
             <a:endParaRPr lang="en-US"/>
           </a:p>
@@ -2736,7 +3352,7 @@
           <a:p>
             <a:fld id="{5BCAD085-E8A6-8845-BD4E-CB4CCA059FC4}" type="datetimeFigureOut">
               <a:rPr lang="en-US" smtClean="0"/>
-              <a:t>9/1/2025</a:t>
+              <a:t>9/2/2025</a:t>
             </a:fld>
             <a:endParaRPr lang="en-US"/>
           </a:p>
@@ -3275,6 +3891,7 @@
                     <a:lstStyle/>
                     <a:p>
                       <a:r>
+                        <a:rPr dirty="0"/>
                         <a:t>Data 1</a:t>
                       </a:r>
                     </a:p>
@@ -3306,6 +3923,7 @@
                     <a:lstStyle/>
                     <a:p>
                       <a:r>
+                        <a:rPr dirty="0"/>
                         <a:t>Data 3</a:t>
                       </a:r>
                     </a:p>
@@ -3318,6 +3936,7 @@
                     <a:lstStyle/>
                     <a:p>
                       <a:r>
+                        <a:rPr dirty="0"/>
                         <a:t>Data 4</a:t>
                       </a:r>
                     </a:p>
@@ -3802,7 +4421,7 @@
             <a:r>
               <a:rPr kumimoji="1" lang="en-US" altLang="ja-JP" dirty="0">
                 <a:latin typeface="+mn-ea"/>
-                <a:hlinkClick r:id="rId2"/>
+                <a:hlinkClick r:id="rId3"/>
               </a:rPr>
               <a:t>http://localhost/</a:t>
             </a:r>
@@ -3815,7 +4434,7 @@
             <a:r>
               <a:rPr kumimoji="1" lang="ja-JP" altLang="en-US" dirty="0">
                 <a:latin typeface="+mn-ea"/>
-                <a:hlinkClick r:id="rId3"/>
+                <a:hlinkClick r:id="rId4"/>
               </a:rPr>
               <a:t>ハイパーリンク </a:t>
             </a:r>
@@ -3873,7 +4492,25 @@
               <a:rPr kumimoji="1" lang="af-ZA" altLang="ja-JP" dirty="0">
                 <a:latin typeface="+mn-ea"/>
               </a:rPr>
-              <a:t>- List[int]</a:t>
+              <a:t>- List[</a:t>
+            </a:r>
+            <a:r>
+              <a:rPr kumimoji="1" lang="af-ZA" altLang="ja-JP" sz="1050" strike="sngStrike" dirty="0">
+                <a:latin typeface="+mn-ea"/>
+              </a:rPr>
+              <a:t>int</a:t>
+            </a:r>
+            <a:r>
+              <a:rPr kumimoji="1" lang="af-ZA" altLang="ja-JP" sz="1050" dirty="0">
+                <a:latin typeface="+mn-ea"/>
+              </a:rPr>
+              <a:t>float</a:t>
+            </a:r>
+            <a:r>
+              <a:rPr kumimoji="1" lang="af-ZA" altLang="ja-JP" dirty="0">
+                <a:latin typeface="+mn-ea"/>
+              </a:rPr>
+              <a:t>]</a:t>
             </a:r>
             <a:r>
               <a:rPr kumimoji="1" lang="ja-JP" altLang="en-US" dirty="0">
@@ -3961,6 +4598,1085 @@
     <p:extLst>
       <p:ext uri="{BB962C8B-B14F-4D97-AF65-F5344CB8AC3E}">
         <p14:creationId xmlns:p14="http://schemas.microsoft.com/office/powerpoint/2010/main" val="1815679496"/>
+      </p:ext>
+    </p:extLst>
+  </p:cSld>
+  <p:clrMapOvr>
+    <a:masterClrMapping/>
+  </p:clrMapOvr>
+</p:sld>
+</file>
+
+<file path=ppt/slides/slide4.xml><?xml version="1.0" encoding="utf-8"?>
+<p:sld xmlns:a="http://schemas.openxmlformats.org/drawingml/2006/main" xmlns:r="http://schemas.openxmlformats.org/officeDocument/2006/relationships" xmlns:p="http://schemas.openxmlformats.org/presentationml/2006/main">
+  <p:cSld>
+    <p:bg>
+      <p:bgPr>
+        <a:solidFill>
+          <a:schemeClr val="bg1"/>
+        </a:solidFill>
+        <a:effectLst/>
+      </p:bgPr>
+    </p:bg>
+    <p:spTree>
+      <p:nvGrpSpPr>
+        <p:cNvPr id="1" name="">
+          <a:extLst>
+            <a:ext uri="{FF2B5EF4-FFF2-40B4-BE49-F238E27FC236}">
+              <a16:creationId xmlns:a16="http://schemas.microsoft.com/office/drawing/2014/main" id="{D4035665-19DC-D2ED-8B5D-7F5A95C1C1C6}"/>
+            </a:ext>
+          </a:extLst>
+        </p:cNvPr>
+        <p:cNvGrpSpPr/>
+        <p:nvPr/>
+      </p:nvGrpSpPr>
+      <p:grpSpPr>
+        <a:xfrm>
+          <a:off x="0" y="0"/>
+          <a:ext cx="0" cy="0"/>
+          <a:chOff x="0" y="0"/>
+          <a:chExt cx="0" cy="0"/>
+        </a:xfrm>
+      </p:grpSpPr>
+      <p:sp useBgFill="1">
+        <p:nvSpPr>
+          <p:cNvPr id="9" name="Rectangle 8">
+            <a:extLst>
+              <a:ext uri="{FF2B5EF4-FFF2-40B4-BE49-F238E27FC236}">
+                <a16:creationId xmlns:a16="http://schemas.microsoft.com/office/drawing/2014/main" id="{09588DA8-065E-4F6F-8EFD-43104AB2E0CF}"/>
+              </a:ext>
+              <a:ext uri="{C183D7F6-B498-43B3-948B-1728B52AA6E4}">
+                <adec:decorative xmlns:adec="http://schemas.microsoft.com/office/drawing/2017/decorative" val="1"/>
+              </a:ext>
+            </a:extLst>
+          </p:cNvPr>
+          <p:cNvSpPr>
+            <a:spLocks noGrp="1" noRot="1" noChangeAspect="1" noMove="1" noResize="1" noEditPoints="1" noAdjustHandles="1" noChangeArrowheads="1" noChangeShapeType="1" noTextEdit="1"/>
+          </p:cNvSpPr>
+          <p:nvPr>
+            <p:extLst>
+              <p:ext uri="{386F3935-93C4-4BCD-93E2-E3B085C9AB24}">
+                <p16:designElem xmlns:p16="http://schemas.microsoft.com/office/powerpoint/2015/main" val="1"/>
+              </p:ext>
+            </p:extLst>
+          </p:nvPr>
+        </p:nvSpPr>
+        <p:spPr>
+          <a:xfrm>
+            <a:off x="0" y="0"/>
+            <a:ext cx="9144000" cy="6858000"/>
+          </a:xfrm>
+          <a:prstGeom prst="rect">
+            <a:avLst/>
+          </a:prstGeom>
+          <a:ln w="12700" cap="flat" cmpd="sng" algn="ctr">
+            <a:noFill/>
+            <a:prstDash val="solid"/>
+            <a:miter lim="800000"/>
+          </a:ln>
+          <a:effectLst/>
+          <a:extLst>
+            <a:ext uri="{91240B29-F687-4F45-9708-019B960494DF}">
+              <a14:hiddenLine xmlns:a14="http://schemas.microsoft.com/office/drawing/2010/main" w="12700" cap="flat" cmpd="sng" algn="ctr">
+                <a:solidFill>
+                  <a:schemeClr val="accent1">
+                    <a:shade val="50000"/>
+                  </a:schemeClr>
+                </a:solidFill>
+                <a:prstDash val="solid"/>
+                <a:miter lim="800000"/>
+              </a14:hiddenLine>
+            </a:ext>
+          </a:extLst>
+        </p:spPr>
+        <p:style>
+          <a:lnRef idx="2">
+            <a:schemeClr val="accent1">
+              <a:shade val="50000"/>
+            </a:schemeClr>
+          </a:lnRef>
+          <a:fillRef idx="1">
+            <a:schemeClr val="accent1"/>
+          </a:fillRef>
+          <a:effectRef idx="0">
+            <a:schemeClr val="accent1"/>
+          </a:effectRef>
+          <a:fontRef idx="minor">
+            <a:schemeClr val="lt1"/>
+          </a:fontRef>
+        </p:style>
+        <p:txBody>
+          <a:bodyPr rtlCol="0" anchor="ctr"/>
+          <a:lstStyle/>
+          <a:p>
+            <a:pPr algn="ctr"/>
+            <a:endParaRPr lang="en-US"/>
+          </a:p>
+        </p:txBody>
+      </p:sp>
+      <p:sp useBgFill="1">
+        <p:nvSpPr>
+          <p:cNvPr id="11" name="Rectangle 10">
+            <a:extLst>
+              <a:ext uri="{FF2B5EF4-FFF2-40B4-BE49-F238E27FC236}">
+                <a16:creationId xmlns:a16="http://schemas.microsoft.com/office/drawing/2014/main" id="{C4285719-470E-454C-AF62-8323075F1F5B}"/>
+              </a:ext>
+              <a:ext uri="{C183D7F6-B498-43B3-948B-1728B52AA6E4}">
+                <adec:decorative xmlns:adec="http://schemas.microsoft.com/office/drawing/2017/decorative" val="1"/>
+              </a:ext>
+            </a:extLst>
+          </p:cNvPr>
+          <p:cNvSpPr>
+            <a:spLocks noGrp="1" noRot="1" noChangeAspect="1" noMove="1" noResize="1" noEditPoints="1" noAdjustHandles="1" noChangeArrowheads="1" noChangeShapeType="1" noTextEdit="1"/>
+          </p:cNvSpPr>
+          <p:nvPr>
+            <p:extLst>
+              <p:ext uri="{386F3935-93C4-4BCD-93E2-E3B085C9AB24}">
+                <p16:designElem xmlns:p16="http://schemas.microsoft.com/office/powerpoint/2015/main" val="1"/>
+              </p:ext>
+            </p:extLst>
+          </p:nvPr>
+        </p:nvSpPr>
+        <p:spPr>
+          <a:xfrm>
+            <a:off x="0" y="0"/>
+            <a:ext cx="9141714" cy="6858000"/>
+          </a:xfrm>
+          <a:prstGeom prst="rect">
+            <a:avLst/>
+          </a:prstGeom>
+          <a:ln w="12700" cap="flat" cmpd="sng" algn="ctr">
+            <a:noFill/>
+            <a:prstDash val="solid"/>
+            <a:miter lim="800000"/>
+          </a:ln>
+          <a:effectLst/>
+          <a:extLst>
+            <a:ext uri="{91240B29-F687-4F45-9708-019B960494DF}">
+              <a14:hiddenLine xmlns:a14="http://schemas.microsoft.com/office/drawing/2010/main" w="12700" cap="flat" cmpd="sng" algn="ctr">
+                <a:solidFill>
+                  <a:schemeClr val="accent1">
+                    <a:shade val="50000"/>
+                  </a:schemeClr>
+                </a:solidFill>
+                <a:prstDash val="solid"/>
+                <a:miter lim="800000"/>
+              </a14:hiddenLine>
+            </a:ext>
+          </a:extLst>
+        </p:spPr>
+        <p:style>
+          <a:lnRef idx="2">
+            <a:schemeClr val="accent1">
+              <a:shade val="50000"/>
+            </a:schemeClr>
+          </a:lnRef>
+          <a:fillRef idx="1">
+            <a:schemeClr val="accent1"/>
+          </a:fillRef>
+          <a:effectRef idx="0">
+            <a:schemeClr val="accent1"/>
+          </a:effectRef>
+          <a:fontRef idx="minor">
+            <a:schemeClr val="lt1"/>
+          </a:fontRef>
+        </p:style>
+        <p:txBody>
+          <a:bodyPr rtlCol="0" anchor="ctr"/>
+          <a:lstStyle/>
+          <a:p>
+            <a:pPr algn="ctr"/>
+            <a:endParaRPr lang="en-US"/>
+          </a:p>
+        </p:txBody>
+      </p:sp>
+      <p:sp>
+        <p:nvSpPr>
+          <p:cNvPr id="13" name="Rectangle 12">
+            <a:extLst>
+              <a:ext uri="{FF2B5EF4-FFF2-40B4-BE49-F238E27FC236}">
+                <a16:creationId xmlns:a16="http://schemas.microsoft.com/office/drawing/2014/main" id="{CD9FE4EF-C4D8-49A0-B2FF-81D8DB7D8A24}"/>
+              </a:ext>
+              <a:ext uri="{C183D7F6-B498-43B3-948B-1728B52AA6E4}">
+                <adec:decorative xmlns:adec="http://schemas.microsoft.com/office/drawing/2017/decorative" val="1"/>
+              </a:ext>
+            </a:extLst>
+          </p:cNvPr>
+          <p:cNvSpPr>
+            <a:spLocks noGrp="1" noRot="1" noChangeAspect="1" noMove="1" noResize="1" noEditPoints="1" noAdjustHandles="1" noChangeArrowheads="1" noChangeShapeType="1" noTextEdit="1"/>
+          </p:cNvSpPr>
+          <p:nvPr>
+            <p:extLst>
+              <p:ext uri="{386F3935-93C4-4BCD-93E2-E3B085C9AB24}">
+                <p16:designElem xmlns:p16="http://schemas.microsoft.com/office/powerpoint/2015/main" val="1"/>
+              </p:ext>
+            </p:extLst>
+          </p:nvPr>
+        </p:nvSpPr>
+        <p:spPr>
+          <a:xfrm rot="5400000" flipH="1">
+            <a:off x="-1914813" y="1914812"/>
+            <a:ext cx="6858000" cy="3028377"/>
+          </a:xfrm>
+          <a:prstGeom prst="rect">
+            <a:avLst/>
+          </a:prstGeom>
+          <a:gradFill>
+            <a:gsLst>
+              <a:gs pos="8000">
+                <a:srgbClr val="000000"/>
+              </a:gs>
+              <a:gs pos="100000">
+                <a:schemeClr val="accent1">
+                  <a:lumMod val="75000"/>
+                </a:schemeClr>
+              </a:gs>
+            </a:gsLst>
+            <a:lin ang="3000000" scaled="0"/>
+          </a:gradFill>
+          <a:ln>
+            <a:noFill/>
+          </a:ln>
+        </p:spPr>
+        <p:style>
+          <a:lnRef idx="2">
+            <a:schemeClr val="accent1">
+              <a:shade val="50000"/>
+            </a:schemeClr>
+          </a:lnRef>
+          <a:fillRef idx="1">
+            <a:schemeClr val="accent1"/>
+          </a:fillRef>
+          <a:effectRef idx="0">
+            <a:schemeClr val="accent1"/>
+          </a:effectRef>
+          <a:fontRef idx="minor">
+            <a:schemeClr val="lt1"/>
+          </a:fontRef>
+        </p:style>
+        <p:txBody>
+          <a:bodyPr rtlCol="0" anchor="ctr"/>
+          <a:lstStyle/>
+          <a:p>
+            <a:pPr algn="ctr"/>
+            <a:endParaRPr lang="en-US"/>
+          </a:p>
+        </p:txBody>
+      </p:sp>
+      <p:sp>
+        <p:nvSpPr>
+          <p:cNvPr id="15" name="Rectangle 14">
+            <a:extLst>
+              <a:ext uri="{FF2B5EF4-FFF2-40B4-BE49-F238E27FC236}">
+                <a16:creationId xmlns:a16="http://schemas.microsoft.com/office/drawing/2014/main" id="{4300840D-0A0B-4512-BACA-B439D5B9C57C}"/>
+              </a:ext>
+              <a:ext uri="{C183D7F6-B498-43B3-948B-1728B52AA6E4}">
+                <adec:decorative xmlns:adec="http://schemas.microsoft.com/office/drawing/2017/decorative" val="1"/>
+              </a:ext>
+            </a:extLst>
+          </p:cNvPr>
+          <p:cNvSpPr>
+            <a:spLocks noGrp="1" noRot="1" noChangeAspect="1" noMove="1" noResize="1" noEditPoints="1" noAdjustHandles="1" noChangeArrowheads="1" noChangeShapeType="1" noTextEdit="1"/>
+          </p:cNvSpPr>
+          <p:nvPr>
+            <p:extLst>
+              <p:ext uri="{386F3935-93C4-4BCD-93E2-E3B085C9AB24}">
+                <p16:designElem xmlns:p16="http://schemas.microsoft.com/office/powerpoint/2015/main" val="1"/>
+              </p:ext>
+            </p:extLst>
+          </p:nvPr>
+        </p:nvSpPr>
+        <p:spPr>
+          <a:xfrm rot="5400000" flipH="1">
+            <a:off x="-1914814" y="1924949"/>
+            <a:ext cx="6857999" cy="3028379"/>
+          </a:xfrm>
+          <a:prstGeom prst="rect">
+            <a:avLst/>
+          </a:prstGeom>
+          <a:gradFill>
+            <a:gsLst>
+              <a:gs pos="0">
+                <a:srgbClr val="000000">
+                  <a:alpha val="0"/>
+                </a:srgbClr>
+              </a:gs>
+              <a:gs pos="99000">
+                <a:schemeClr val="accent1">
+                  <a:alpha val="46000"/>
+                </a:schemeClr>
+              </a:gs>
+            </a:gsLst>
+            <a:lin ang="1800000" scaled="0"/>
+          </a:gradFill>
+          <a:ln>
+            <a:noFill/>
+          </a:ln>
+        </p:spPr>
+        <p:style>
+          <a:lnRef idx="2">
+            <a:schemeClr val="accent1">
+              <a:shade val="50000"/>
+            </a:schemeClr>
+          </a:lnRef>
+          <a:fillRef idx="1">
+            <a:schemeClr val="accent1"/>
+          </a:fillRef>
+          <a:effectRef idx="0">
+            <a:schemeClr val="accent1"/>
+          </a:effectRef>
+          <a:fontRef idx="minor">
+            <a:schemeClr val="lt1"/>
+          </a:fontRef>
+        </p:style>
+        <p:txBody>
+          <a:bodyPr rtlCol="0" anchor="ctr"/>
+          <a:lstStyle/>
+          <a:p>
+            <a:pPr algn="ctr"/>
+            <a:endParaRPr lang="en-US"/>
+          </a:p>
+        </p:txBody>
+      </p:sp>
+      <p:sp>
+        <p:nvSpPr>
+          <p:cNvPr id="17" name="Rectangle 16">
+            <a:extLst>
+              <a:ext uri="{FF2B5EF4-FFF2-40B4-BE49-F238E27FC236}">
+                <a16:creationId xmlns:a16="http://schemas.microsoft.com/office/drawing/2014/main" id="{D2B78728-A580-49A7-84F9-6EF6F583ADE0}"/>
+              </a:ext>
+              <a:ext uri="{C183D7F6-B498-43B3-948B-1728B52AA6E4}">
+                <adec:decorative xmlns:adec="http://schemas.microsoft.com/office/drawing/2017/decorative" val="1"/>
+              </a:ext>
+            </a:extLst>
+          </p:cNvPr>
+          <p:cNvSpPr>
+            <a:spLocks noGrp="1" noRot="1" noChangeAspect="1" noMove="1" noResize="1" noEditPoints="1" noAdjustHandles="1" noChangeArrowheads="1" noChangeShapeType="1" noTextEdit="1"/>
+          </p:cNvSpPr>
+          <p:nvPr>
+            <p:extLst>
+              <p:ext uri="{386F3935-93C4-4BCD-93E2-E3B085C9AB24}">
+                <p16:designElem xmlns:p16="http://schemas.microsoft.com/office/powerpoint/2015/main" val="1"/>
+              </p:ext>
+            </p:extLst>
+          </p:nvPr>
+        </p:nvSpPr>
+        <p:spPr>
+          <a:xfrm rot="5400000" flipH="1">
+            <a:off x="263195" y="4092815"/>
+            <a:ext cx="2501979" cy="3028381"/>
+          </a:xfrm>
+          <a:prstGeom prst="rect">
+            <a:avLst/>
+          </a:prstGeom>
+          <a:gradFill>
+            <a:gsLst>
+              <a:gs pos="2000">
+                <a:schemeClr val="accent1">
+                  <a:alpha val="29000"/>
+                </a:schemeClr>
+              </a:gs>
+              <a:gs pos="100000">
+                <a:srgbClr val="000000">
+                  <a:alpha val="30000"/>
+                </a:srgbClr>
+              </a:gs>
+            </a:gsLst>
+            <a:lin ang="7800000" scaled="0"/>
+          </a:gradFill>
+          <a:ln>
+            <a:noFill/>
+          </a:ln>
+        </p:spPr>
+        <p:style>
+          <a:lnRef idx="2">
+            <a:schemeClr val="accent1">
+              <a:shade val="50000"/>
+            </a:schemeClr>
+          </a:lnRef>
+          <a:fillRef idx="1">
+            <a:schemeClr val="accent1"/>
+          </a:fillRef>
+          <a:effectRef idx="0">
+            <a:schemeClr val="accent1"/>
+          </a:effectRef>
+          <a:fontRef idx="minor">
+            <a:schemeClr val="lt1"/>
+          </a:fontRef>
+        </p:style>
+        <p:txBody>
+          <a:bodyPr rtlCol="0" anchor="ctr"/>
+          <a:lstStyle/>
+          <a:p>
+            <a:pPr algn="ctr"/>
+            <a:endParaRPr lang="en-US" dirty="0"/>
+          </a:p>
+        </p:txBody>
+      </p:sp>
+      <p:sp>
+        <p:nvSpPr>
+          <p:cNvPr id="19" name="Freeform: Shape 18">
+            <a:extLst>
+              <a:ext uri="{FF2B5EF4-FFF2-40B4-BE49-F238E27FC236}">
+                <a16:creationId xmlns:a16="http://schemas.microsoft.com/office/drawing/2014/main" id="{38FAA1A1-D861-433F-88FA-1E9D6FD31D11}"/>
+              </a:ext>
+              <a:ext uri="{C183D7F6-B498-43B3-948B-1728B52AA6E4}">
+                <adec:decorative xmlns:adec="http://schemas.microsoft.com/office/drawing/2017/decorative" val="1"/>
+              </a:ext>
+            </a:extLst>
+          </p:cNvPr>
+          <p:cNvSpPr>
+            <a:spLocks noGrp="1" noRot="1" noChangeAspect="1" noMove="1" noResize="1" noEditPoints="1" noAdjustHandles="1" noChangeArrowheads="1" noChangeShapeType="1" noTextEdit="1"/>
+          </p:cNvSpPr>
+          <p:nvPr>
+            <p:extLst>
+              <p:ext uri="{386F3935-93C4-4BCD-93E2-E3B085C9AB24}">
+                <p16:designElem xmlns:p16="http://schemas.microsoft.com/office/powerpoint/2015/main" val="1"/>
+              </p:ext>
+            </p:extLst>
+          </p:nvPr>
+        </p:nvSpPr>
+        <p:spPr>
+          <a:xfrm rot="20635413">
+            <a:off x="-376302" y="969718"/>
+            <a:ext cx="2925267" cy="4178958"/>
+          </a:xfrm>
+          <a:custGeom>
+            <a:avLst/>
+            <a:gdLst>
+              <a:gd name="connsiteX0" fmla="*/ 2432225 w 3900357"/>
+              <a:gd name="connsiteY0" fmla="*/ 93939 h 4178958"/>
+              <a:gd name="connsiteX1" fmla="*/ 3900357 w 3900357"/>
+              <a:gd name="connsiteY1" fmla="*/ 2089479 h 4178958"/>
+              <a:gd name="connsiteX2" fmla="*/ 1810878 w 3900357"/>
+              <a:gd name="connsiteY2" fmla="*/ 4178958 h 4178958"/>
+              <a:gd name="connsiteX3" fmla="*/ 78249 w 3900357"/>
+              <a:gd name="connsiteY3" fmla="*/ 3257727 h 4178958"/>
+              <a:gd name="connsiteX4" fmla="*/ 0 w 3900357"/>
+              <a:gd name="connsiteY4" fmla="*/ 3128923 h 4178958"/>
+              <a:gd name="connsiteX5" fmla="*/ 831324 w 3900357"/>
+              <a:gd name="connsiteY5" fmla="*/ 244281 h 4178958"/>
+              <a:gd name="connsiteX6" fmla="*/ 997559 w 3900357"/>
+              <a:gd name="connsiteY6" fmla="*/ 164202 h 4178958"/>
+              <a:gd name="connsiteX7" fmla="*/ 1810878 w 3900357"/>
+              <a:gd name="connsiteY7" fmla="*/ 0 h 4178958"/>
+              <a:gd name="connsiteX8" fmla="*/ 2432225 w 3900357"/>
+              <a:gd name="connsiteY8" fmla="*/ 93939 h 4178958"/>
+            </a:gdLst>
+            <a:ahLst/>
+            <a:cxnLst>
+              <a:cxn ang="0">
+                <a:pos x="connsiteX0" y="connsiteY0"/>
+              </a:cxn>
+              <a:cxn ang="0">
+                <a:pos x="connsiteX1" y="connsiteY1"/>
+              </a:cxn>
+              <a:cxn ang="0">
+                <a:pos x="connsiteX2" y="connsiteY2"/>
+              </a:cxn>
+              <a:cxn ang="0">
+                <a:pos x="connsiteX3" y="connsiteY3"/>
+              </a:cxn>
+              <a:cxn ang="0">
+                <a:pos x="connsiteX4" y="connsiteY4"/>
+              </a:cxn>
+              <a:cxn ang="0">
+                <a:pos x="connsiteX5" y="connsiteY5"/>
+              </a:cxn>
+              <a:cxn ang="0">
+                <a:pos x="connsiteX6" y="connsiteY6"/>
+              </a:cxn>
+              <a:cxn ang="0">
+                <a:pos x="connsiteX7" y="connsiteY7"/>
+              </a:cxn>
+              <a:cxn ang="0">
+                <a:pos x="connsiteX8" y="connsiteY8"/>
+              </a:cxn>
+            </a:cxnLst>
+            <a:rect l="l" t="t" r="r" b="b"/>
+            <a:pathLst>
+              <a:path w="3900357" h="4178958">
+                <a:moveTo>
+                  <a:pt x="2432225" y="93939"/>
+                </a:moveTo>
+                <a:cubicBezTo>
+                  <a:pt x="3282786" y="358491"/>
+                  <a:pt x="3900357" y="1151865"/>
+                  <a:pt x="3900357" y="2089479"/>
+                </a:cubicBezTo>
+                <a:cubicBezTo>
+                  <a:pt x="3900357" y="3243466"/>
+                  <a:pt x="2964865" y="4178958"/>
+                  <a:pt x="1810878" y="4178958"/>
+                </a:cubicBezTo>
+                <a:cubicBezTo>
+                  <a:pt x="1089636" y="4178958"/>
+                  <a:pt x="453744" y="3813531"/>
+                  <a:pt x="78249" y="3257727"/>
+                </a:cubicBezTo>
+                <a:lnTo>
+                  <a:pt x="0" y="3128923"/>
+                </a:lnTo>
+                <a:lnTo>
+                  <a:pt x="831324" y="244281"/>
+                </a:lnTo>
+                <a:lnTo>
+                  <a:pt x="997559" y="164202"/>
+                </a:lnTo>
+                <a:cubicBezTo>
+                  <a:pt x="1247540" y="58468"/>
+                  <a:pt x="1522381" y="0"/>
+                  <a:pt x="1810878" y="0"/>
+                </a:cubicBezTo>
+                <a:cubicBezTo>
+                  <a:pt x="2027251" y="0"/>
+                  <a:pt x="2235942" y="32888"/>
+                  <a:pt x="2432225" y="93939"/>
+                </a:cubicBezTo>
+                <a:close/>
+              </a:path>
+            </a:pathLst>
+          </a:custGeom>
+          <a:gradFill>
+            <a:gsLst>
+              <a:gs pos="29000">
+                <a:srgbClr val="000000">
+                  <a:alpha val="0"/>
+                </a:srgbClr>
+              </a:gs>
+              <a:gs pos="100000">
+                <a:schemeClr val="accent1">
+                  <a:alpha val="43000"/>
+                </a:schemeClr>
+              </a:gs>
+            </a:gsLst>
+            <a:lin ang="1800000" scaled="0"/>
+          </a:gradFill>
+          <a:ln>
+            <a:noFill/>
+          </a:ln>
+        </p:spPr>
+        <p:style>
+          <a:lnRef idx="2">
+            <a:schemeClr val="accent1">
+              <a:shade val="50000"/>
+            </a:schemeClr>
+          </a:lnRef>
+          <a:fillRef idx="1">
+            <a:schemeClr val="accent1"/>
+          </a:fillRef>
+          <a:effectRef idx="0">
+            <a:schemeClr val="accent1"/>
+          </a:effectRef>
+          <a:fontRef idx="minor">
+            <a:schemeClr val="lt1"/>
+          </a:fontRef>
+        </p:style>
+        <p:txBody>
+          <a:bodyPr wrap="square" rtlCol="0" anchor="ctr">
+            <a:noAutofit/>
+          </a:bodyPr>
+          <a:lstStyle/>
+          <a:p>
+            <a:pPr algn="ctr"/>
+            <a:endParaRPr lang="en-US" dirty="0"/>
+          </a:p>
+        </p:txBody>
+      </p:sp>
+      <p:sp>
+        <p:nvSpPr>
+          <p:cNvPr id="21" name="Rectangle 20">
+            <a:extLst>
+              <a:ext uri="{FF2B5EF4-FFF2-40B4-BE49-F238E27FC236}">
+                <a16:creationId xmlns:a16="http://schemas.microsoft.com/office/drawing/2014/main" id="{8D71EDA1-87BF-4D5D-AB79-F346FD19278A}"/>
+              </a:ext>
+              <a:ext uri="{C183D7F6-B498-43B3-948B-1728B52AA6E4}">
+                <adec:decorative xmlns:adec="http://schemas.microsoft.com/office/drawing/2017/decorative" val="1"/>
+              </a:ext>
+            </a:extLst>
+          </p:cNvPr>
+          <p:cNvSpPr>
+            <a:spLocks noGrp="1" noRot="1" noChangeAspect="1" noMove="1" noResize="1" noEditPoints="1" noAdjustHandles="1" noChangeArrowheads="1" noChangeShapeType="1" noTextEdit="1"/>
+          </p:cNvSpPr>
+          <p:nvPr>
+            <p:extLst>
+              <p:ext uri="{386F3935-93C4-4BCD-93E2-E3B085C9AB24}">
+                <p16:designElem xmlns:p16="http://schemas.microsoft.com/office/powerpoint/2015/main" val="1"/>
+              </p:ext>
+            </p:extLst>
+          </p:nvPr>
+        </p:nvSpPr>
+        <p:spPr>
+          <a:xfrm rot="5400000" flipH="1">
+            <a:off x="-1914820" y="1904672"/>
+            <a:ext cx="6858003" cy="3028376"/>
+          </a:xfrm>
+          <a:prstGeom prst="rect">
+            <a:avLst/>
+          </a:prstGeom>
+          <a:gradFill>
+            <a:gsLst>
+              <a:gs pos="0">
+                <a:srgbClr val="000000">
+                  <a:alpha val="0"/>
+                </a:srgbClr>
+              </a:gs>
+              <a:gs pos="99000">
+                <a:schemeClr val="accent1">
+                  <a:lumMod val="60000"/>
+                  <a:lumOff val="40000"/>
+                  <a:alpha val="11000"/>
+                </a:schemeClr>
+              </a:gs>
+            </a:gsLst>
+            <a:lin ang="7200000" scaled="0"/>
+          </a:gradFill>
+          <a:ln>
+            <a:noFill/>
+          </a:ln>
+        </p:spPr>
+        <p:style>
+          <a:lnRef idx="2">
+            <a:schemeClr val="accent1">
+              <a:shade val="50000"/>
+            </a:schemeClr>
+          </a:lnRef>
+          <a:fillRef idx="1">
+            <a:schemeClr val="accent1"/>
+          </a:fillRef>
+          <a:effectRef idx="0">
+            <a:schemeClr val="accent1"/>
+          </a:effectRef>
+          <a:fontRef idx="minor">
+            <a:schemeClr val="lt1"/>
+          </a:fontRef>
+        </p:style>
+        <p:txBody>
+          <a:bodyPr rtlCol="0" anchor="ctr"/>
+          <a:lstStyle/>
+          <a:p>
+            <a:pPr algn="ctr"/>
+            <a:endParaRPr lang="en-US"/>
+          </a:p>
+        </p:txBody>
+      </p:sp>
+      <p:sp>
+        <p:nvSpPr>
+          <p:cNvPr id="2" name="Title 1">
+            <a:extLst>
+              <a:ext uri="{FF2B5EF4-FFF2-40B4-BE49-F238E27FC236}">
+                <a16:creationId xmlns:a16="http://schemas.microsoft.com/office/drawing/2014/main" id="{2FD421FE-4FD0-F21E-67B1-3268C6B77CDA}"/>
+              </a:ext>
+            </a:extLst>
+          </p:cNvPr>
+          <p:cNvSpPr>
+            <a:spLocks noGrp="1"/>
+          </p:cNvSpPr>
+          <p:nvPr>
+            <p:ph type="title"/>
+          </p:nvPr>
+        </p:nvSpPr>
+        <p:spPr>
+          <a:xfrm>
+            <a:off x="350041" y="586855"/>
+            <a:ext cx="2401025" cy="3387497"/>
+          </a:xfrm>
+        </p:spPr>
+        <p:txBody>
+          <a:bodyPr anchor="b">
+            <a:normAutofit/>
+          </a:bodyPr>
+          <a:lstStyle/>
+          <a:p>
+            <a:pPr algn="r"/>
+            <a:r>
+              <a:rPr lang="en-US" altLang="ja-JP" sz="3500" b="1">
+                <a:solidFill>
+                  <a:srgbClr val="FFFFFF"/>
+                </a:solidFill>
+              </a:rPr>
+              <a:t>Text</a:t>
+            </a:r>
+            <a:r>
+              <a:rPr lang="en-US" altLang="ja-JP" sz="3500">
+                <a:solidFill>
+                  <a:srgbClr val="FFFFFF"/>
+                </a:solidFill>
+              </a:rPr>
+              <a:t> Slide 2nd</a:t>
+            </a:r>
+            <a:endParaRPr lang="en-US" sz="3500">
+              <a:solidFill>
+                <a:srgbClr val="FFFFFF"/>
+              </a:solidFill>
+            </a:endParaRPr>
+          </a:p>
+        </p:txBody>
+      </p:sp>
+      <p:sp>
+        <p:nvSpPr>
+          <p:cNvPr id="3" name="コンテンツ プレースホルダー 2">
+            <a:extLst>
+              <a:ext uri="{FF2B5EF4-FFF2-40B4-BE49-F238E27FC236}">
+                <a16:creationId xmlns:a16="http://schemas.microsoft.com/office/drawing/2014/main" id="{344E7261-6E1E-24E5-873E-7121EC578AD7}"/>
+              </a:ext>
+            </a:extLst>
+          </p:cNvPr>
+          <p:cNvSpPr>
+            <a:spLocks noGrp="1"/>
+          </p:cNvSpPr>
+          <p:nvPr>
+            <p:ph idx="1"/>
+          </p:nvPr>
+        </p:nvSpPr>
+        <p:spPr>
+          <a:xfrm>
+            <a:off x="3607694" y="649480"/>
+            <a:ext cx="4916510" cy="5546047"/>
+          </a:xfrm>
+        </p:spPr>
+        <p:txBody>
+          <a:bodyPr anchor="ctr">
+            <a:normAutofit/>
+          </a:bodyPr>
+          <a:lstStyle/>
+          <a:p>
+            <a:r>
+              <a:rPr kumimoji="1" lang="ja-JP" altLang="en-US" sz="1700" dirty="0">
+                <a:latin typeface="+mn-ea"/>
+              </a:rPr>
+              <a:t>サンプルテキスト</a:t>
+            </a:r>
+            <a:endParaRPr kumimoji="1" lang="en-US" altLang="ja-JP" sz="1700" dirty="0">
+              <a:latin typeface="+mn-ea"/>
+            </a:endParaRPr>
+          </a:p>
+          <a:p>
+            <a:r>
+              <a:rPr kumimoji="1" lang="ja-JP" altLang="en-US" sz="1700" b="1" dirty="0">
+                <a:latin typeface="+mn-ea"/>
+              </a:rPr>
+              <a:t>太字 </a:t>
+            </a:r>
+            <a:r>
+              <a:rPr kumimoji="1" lang="en-US" altLang="ja-JP" sz="1700" b="1" dirty="0">
+                <a:latin typeface="+mn-ea"/>
+              </a:rPr>
+              <a:t>(</a:t>
+            </a:r>
+            <a:r>
+              <a:rPr kumimoji="1" lang="af-ZA" altLang="ja-JP" sz="1700" b="1" dirty="0">
+                <a:latin typeface="+mn-ea"/>
+              </a:rPr>
+              <a:t>bolded) </a:t>
+            </a:r>
+            <a:r>
+              <a:rPr kumimoji="1" lang="af-ZA" altLang="ja-JP" sz="1700" dirty="0">
+                <a:latin typeface="+mn-ea"/>
+              </a:rPr>
+              <a:t>- int</a:t>
+            </a:r>
+            <a:r>
+              <a:rPr kumimoji="1" lang="ja-JP" altLang="en-US" sz="1700" dirty="0">
+                <a:latin typeface="+mn-ea"/>
+              </a:rPr>
+              <a:t>型カウンター</a:t>
+            </a:r>
+          </a:p>
+          <a:p>
+            <a:r>
+              <a:rPr kumimoji="1" lang="ja-JP" altLang="en-US" sz="1700" i="1" dirty="0">
+                <a:latin typeface="+mn-ea"/>
+              </a:rPr>
+              <a:t>斜体 </a:t>
+            </a:r>
+            <a:r>
+              <a:rPr kumimoji="1" lang="en-US" altLang="ja-JP" sz="1700" i="1" dirty="0">
+                <a:latin typeface="+mn-ea"/>
+              </a:rPr>
+              <a:t>(</a:t>
+            </a:r>
+            <a:r>
+              <a:rPr kumimoji="1" lang="af-ZA" altLang="ja-JP" sz="1700" i="1" dirty="0">
+                <a:latin typeface="+mn-ea"/>
+              </a:rPr>
+              <a:t>italic) </a:t>
+            </a:r>
+            <a:r>
+              <a:rPr kumimoji="1" lang="af-ZA" altLang="ja-JP" sz="1700" dirty="0">
+                <a:latin typeface="+mn-ea"/>
+              </a:rPr>
+              <a:t>- int</a:t>
+            </a:r>
+            <a:r>
+              <a:rPr kumimoji="1" lang="ja-JP" altLang="en-US" sz="1700" dirty="0">
+                <a:latin typeface="+mn-ea"/>
+              </a:rPr>
+              <a:t>型カウンター</a:t>
+            </a:r>
+          </a:p>
+          <a:p>
+            <a:r>
+              <a:rPr kumimoji="1" lang="ja-JP" altLang="en-US" sz="1700" u="sng" dirty="0">
+                <a:latin typeface="+mn-ea"/>
+              </a:rPr>
+              <a:t>下線 </a:t>
+            </a:r>
+            <a:r>
+              <a:rPr kumimoji="1" lang="en-US" altLang="ja-JP" sz="1700" u="sng" dirty="0">
+                <a:latin typeface="+mn-ea"/>
+              </a:rPr>
+              <a:t>(</a:t>
+            </a:r>
+            <a:r>
+              <a:rPr kumimoji="1" lang="af-ZA" altLang="ja-JP" sz="1700" u="sng" dirty="0">
+                <a:latin typeface="+mn-ea"/>
+              </a:rPr>
+              <a:t>underlined) </a:t>
+            </a:r>
+            <a:r>
+              <a:rPr kumimoji="1" lang="af-ZA" altLang="ja-JP" sz="1700" dirty="0">
+                <a:latin typeface="+mn-ea"/>
+              </a:rPr>
+              <a:t>- int</a:t>
+            </a:r>
+            <a:r>
+              <a:rPr kumimoji="1" lang="ja-JP" altLang="en-US" sz="1700" dirty="0">
+                <a:latin typeface="+mn-ea"/>
+              </a:rPr>
+              <a:t>型カウンター</a:t>
+            </a:r>
+          </a:p>
+          <a:p>
+            <a:r>
+              <a:rPr kumimoji="1" lang="ja-JP" altLang="en-US" sz="1700" dirty="0">
+                <a:highlight>
+                  <a:srgbClr val="FFFF00"/>
+                </a:highlight>
+                <a:latin typeface="+mn-ea"/>
+              </a:rPr>
+              <a:t>ハイライト </a:t>
+            </a:r>
+            <a:r>
+              <a:rPr kumimoji="1" lang="en-US" altLang="ja-JP" sz="1700" dirty="0">
+                <a:highlight>
+                  <a:srgbClr val="FFFF00"/>
+                </a:highlight>
+                <a:latin typeface="+mn-ea"/>
+              </a:rPr>
+              <a:t>(</a:t>
+            </a:r>
+            <a:r>
+              <a:rPr kumimoji="1" lang="af-ZA" altLang="ja-JP" sz="1700" dirty="0">
+                <a:highlight>
+                  <a:srgbClr val="FFFF00"/>
+                </a:highlight>
+                <a:latin typeface="+mn-ea"/>
+              </a:rPr>
+              <a:t>highlighted) </a:t>
+            </a:r>
+            <a:r>
+              <a:rPr kumimoji="1" lang="af-ZA" altLang="ja-JP" sz="1700" dirty="0">
+                <a:latin typeface="+mn-ea"/>
+              </a:rPr>
+              <a:t>- int</a:t>
+            </a:r>
+            <a:r>
+              <a:rPr kumimoji="1" lang="ja-JP" altLang="en-US" sz="1700" dirty="0">
+                <a:latin typeface="+mn-ea"/>
+              </a:rPr>
+              <a:t>型カウンター</a:t>
+            </a:r>
+          </a:p>
+          <a:p>
+            <a:r>
+              <a:rPr kumimoji="1" lang="ja-JP" altLang="en-US" sz="1700" strike="sngStrike" dirty="0">
+                <a:latin typeface="+mn-ea"/>
+              </a:rPr>
+              <a:t>取り消し線 </a:t>
+            </a:r>
+            <a:r>
+              <a:rPr kumimoji="1" lang="en-US" altLang="ja-JP" sz="1700" strike="sngStrike" dirty="0">
+                <a:latin typeface="+mn-ea"/>
+              </a:rPr>
+              <a:t>(</a:t>
+            </a:r>
+            <a:r>
+              <a:rPr kumimoji="1" lang="af-ZA" altLang="ja-JP" sz="1700" strike="sngStrike" dirty="0">
+                <a:latin typeface="+mn-ea"/>
+              </a:rPr>
+              <a:t>strikethrough) </a:t>
+            </a:r>
+            <a:r>
+              <a:rPr kumimoji="1" lang="af-ZA" altLang="ja-JP" sz="1700" dirty="0">
+                <a:latin typeface="+mn-ea"/>
+              </a:rPr>
+              <a:t>- int</a:t>
+            </a:r>
+            <a:r>
+              <a:rPr kumimoji="1" lang="ja-JP" altLang="en-US" sz="1700" dirty="0">
+                <a:latin typeface="+mn-ea"/>
+              </a:rPr>
+              <a:t>型カウンター</a:t>
+            </a:r>
+          </a:p>
+          <a:p>
+            <a:r>
+              <a:rPr kumimoji="1" lang="en-US" altLang="ja-JP" sz="1700" dirty="0">
+                <a:latin typeface="+mn-ea"/>
+                <a:hlinkClick r:id="rId3"/>
+              </a:rPr>
+              <a:t>http://localhost/</a:t>
+            </a:r>
+            <a:r>
+              <a:rPr kumimoji="1" lang="en-US" altLang="ja-JP" sz="1700" dirty="0">
+                <a:latin typeface="+mn-ea"/>
+              </a:rPr>
+              <a:t> </a:t>
+            </a:r>
+            <a:r>
+              <a:rPr kumimoji="1" lang="ja-JP" altLang="en-US" sz="1700" dirty="0">
+                <a:latin typeface="+mn-ea"/>
+                <a:hlinkClick r:id="rId4"/>
+              </a:rPr>
+              <a:t>ハイパーリンク </a:t>
+            </a:r>
+            <a:r>
+              <a:rPr kumimoji="1" lang="en-US" altLang="ja-JP" sz="1700" dirty="0">
+                <a:latin typeface="+mn-ea"/>
+              </a:rPr>
+              <a:t>(</a:t>
+            </a:r>
+            <a:r>
+              <a:rPr kumimoji="1" lang="af-ZA" altLang="ja-JP" sz="1700" dirty="0">
+                <a:latin typeface="+mn-ea"/>
+              </a:rPr>
+              <a:t>hyperlinks) - List[str]</a:t>
+            </a:r>
+            <a:r>
+              <a:rPr kumimoji="1" lang="ja-JP" altLang="en-US" sz="1700" dirty="0">
+                <a:latin typeface="+mn-ea"/>
+              </a:rPr>
+              <a:t>型（</a:t>
+            </a:r>
+            <a:r>
+              <a:rPr kumimoji="1" lang="af-ZA" altLang="ja-JP" sz="1700" dirty="0">
+                <a:latin typeface="+mn-ea"/>
+              </a:rPr>
+              <a:t>URL</a:t>
+            </a:r>
+            <a:r>
+              <a:rPr kumimoji="1" lang="ja-JP" altLang="en-US" sz="1700" dirty="0">
+                <a:latin typeface="+mn-ea"/>
+              </a:rPr>
+              <a:t>のリスト）</a:t>
+            </a:r>
+          </a:p>
+          <a:p>
+            <a:r>
+              <a:rPr kumimoji="1" lang="ja-JP" altLang="en-US" sz="2400" dirty="0">
+                <a:latin typeface="+mn-ea"/>
+              </a:rPr>
+              <a:t>フォントサイズ </a:t>
+            </a:r>
+            <a:r>
+              <a:rPr kumimoji="1" lang="en-US" altLang="ja-JP" sz="2400" dirty="0">
+                <a:latin typeface="+mn-ea"/>
+              </a:rPr>
+              <a:t>(</a:t>
+            </a:r>
+            <a:r>
+              <a:rPr kumimoji="1" lang="af-ZA" altLang="ja-JP" sz="2400" dirty="0">
+                <a:latin typeface="+mn-ea"/>
+              </a:rPr>
+              <a:t>font_sizes) </a:t>
+            </a:r>
+            <a:r>
+              <a:rPr kumimoji="1" lang="af-ZA" altLang="ja-JP" sz="1700" dirty="0">
+                <a:latin typeface="+mn-ea"/>
+              </a:rPr>
+              <a:t>- List[</a:t>
+            </a:r>
+            <a:r>
+              <a:rPr kumimoji="1" lang="af-ZA" altLang="ja-JP" sz="950" dirty="0">
+                <a:latin typeface="+mn-ea"/>
+              </a:rPr>
+              <a:t>float</a:t>
+            </a:r>
+            <a:r>
+              <a:rPr kumimoji="1" lang="af-ZA" altLang="ja-JP" sz="1700" dirty="0">
+                <a:latin typeface="+mn-ea"/>
+              </a:rPr>
+              <a:t>]</a:t>
+            </a:r>
+            <a:r>
+              <a:rPr kumimoji="1" lang="ja-JP" altLang="en-US" sz="1700" dirty="0">
+                <a:latin typeface="+mn-ea"/>
+              </a:rPr>
+              <a:t>型</a:t>
+            </a:r>
+          </a:p>
+          <a:p>
+            <a:r>
+              <a:rPr kumimoji="1" lang="ja-JP" altLang="en-US" sz="1700" dirty="0">
+                <a:latin typeface="+mn-ea"/>
+              </a:rPr>
+              <a:t>フォント色 </a:t>
+            </a:r>
+            <a:r>
+              <a:rPr kumimoji="1" lang="en-US" altLang="ja-JP" sz="1700" dirty="0">
+                <a:latin typeface="+mn-ea"/>
+              </a:rPr>
+              <a:t>(</a:t>
+            </a:r>
+            <a:r>
+              <a:rPr kumimoji="1" lang="af-ZA" altLang="ja-JP" sz="1700" dirty="0">
+                <a:latin typeface="+mn-ea"/>
+              </a:rPr>
+              <a:t>font_colors) - List[str]</a:t>
+            </a:r>
+            <a:r>
+              <a:rPr kumimoji="1" lang="ja-JP" altLang="en-US" sz="1700" dirty="0">
+                <a:latin typeface="+mn-ea"/>
+              </a:rPr>
+              <a:t>型</a:t>
+            </a:r>
+            <a:endParaRPr kumimoji="1" lang="en-US" altLang="ja-JP" sz="1700" dirty="0">
+              <a:latin typeface="+mn-ea"/>
+            </a:endParaRPr>
+          </a:p>
+          <a:p>
+            <a:r>
+              <a:rPr kumimoji="1" lang="ja-JP" altLang="en-US" sz="1700" b="1" i="1" u="sng" strike="sngStrike" dirty="0">
+                <a:highlight>
+                  <a:srgbClr val="FFFF00"/>
+                </a:highlight>
+                <a:latin typeface="+mn-ea"/>
+              </a:rPr>
+              <a:t>ご</a:t>
+            </a:r>
+            <a:r>
+              <a:rPr kumimoji="1" lang="ja-JP" altLang="en-US" sz="1700" b="1" i="1" u="sng" strike="sngStrike" dirty="0">
+                <a:latin typeface="+mn-ea"/>
+              </a:rPr>
+              <a:t>ちゃま</a:t>
+            </a:r>
+            <a:r>
+              <a:rPr kumimoji="1" lang="ja-JP" altLang="en-US" sz="1700" b="1" i="1" u="sng" strike="sngStrike" dirty="0">
+                <a:highlight>
+                  <a:srgbClr val="FFFF00"/>
+                </a:highlight>
+                <a:latin typeface="+mn-ea"/>
+              </a:rPr>
+              <a:t>ぜ</a:t>
+            </a:r>
+          </a:p>
+        </p:txBody>
+      </p:sp>
+    </p:spTree>
+    <p:extLst>
+      <p:ext uri="{BB962C8B-B14F-4D97-AF65-F5344CB8AC3E}">
+        <p14:creationId xmlns:p14="http://schemas.microsoft.com/office/powerpoint/2010/main" val="1112852344"/>
       </p:ext>
     </p:extLst>
   </p:cSld>
@@ -4288,4 +6004,319 @@
   </a:objectDefaults>
   <a:extraClrSchemeLst/>
 </a:theme>
+</file>
+
+<file path=ppt/theme/theme2.xml><?xml version="1.0" encoding="utf-8"?>
+<a:theme xmlns:a="http://schemas.openxmlformats.org/drawingml/2006/main" name="Office テーマ">
+  <a:themeElements>
+    <a:clrScheme name="Office">
+      <a:dk1>
+        <a:sysClr val="windowText" lastClr="000000"/>
+      </a:dk1>
+      <a:lt1>
+        <a:sysClr val="window" lastClr="FFFFFF"/>
+      </a:lt1>
+      <a:dk2>
+        <a:srgbClr val="0E2841"/>
+      </a:dk2>
+      <a:lt2>
+        <a:srgbClr val="E8E8E8"/>
+      </a:lt2>
+      <a:accent1>
+        <a:srgbClr val="156082"/>
+      </a:accent1>
+      <a:accent2>
+        <a:srgbClr val="E97132"/>
+      </a:accent2>
+      <a:accent3>
+        <a:srgbClr val="196B24"/>
+      </a:accent3>
+      <a:accent4>
+        <a:srgbClr val="0F9ED5"/>
+      </a:accent4>
+      <a:accent5>
+        <a:srgbClr val="A02B93"/>
+      </a:accent5>
+      <a:accent6>
+        <a:srgbClr val="4EA72E"/>
+      </a:accent6>
+      <a:hlink>
+        <a:srgbClr val="467886"/>
+      </a:hlink>
+      <a:folHlink>
+        <a:srgbClr val="96607D"/>
+      </a:folHlink>
+    </a:clrScheme>
+    <a:fontScheme name="Office">
+      <a:majorFont>
+        <a:latin typeface="游ゴシック Light" panose="02110004020202020204"/>
+        <a:ea typeface=""/>
+        <a:cs typeface=""/>
+        <a:font script="Jpan" typeface="游ゴシック Light"/>
+        <a:font script="Hang" typeface="맑은 고딕"/>
+        <a:font script="Hans" typeface="等线 Light"/>
+        <a:font script="Hant" typeface="新細明體"/>
+        <a:font script="Arab" typeface="Times New Roman"/>
+        <a:font script="Hebr" typeface="Times New Roman"/>
+        <a:font script="Thai" typeface="Angsana New"/>
+        <a:font script="Ethi" typeface="Nyala"/>
+        <a:font script="Beng" typeface="Vrinda"/>
+        <a:font script="Gujr" typeface="Shruti"/>
+        <a:font script="Khmr" typeface="MoolBoran"/>
+        <a:font script="Knda" typeface="Tunga"/>
+        <a:font script="Guru" typeface="Raavi"/>
+        <a:font script="Cans" typeface="Euphemia"/>
+        <a:font script="Cher" typeface="Plantagenet Cherokee"/>
+        <a:font script="Yiii" typeface="Microsoft Yi Baiti"/>
+        <a:font script="Tibt" typeface="Microsoft Himalaya"/>
+        <a:font script="Thaa" typeface="MV Boli"/>
+        <a:font script="Deva" typeface="Mangal"/>
+        <a:font script="Telu" typeface="Gautami"/>
+        <a:font script="Taml" typeface="Latha"/>
+        <a:font script="Syrc" typeface="Estrangelo Edessa"/>
+        <a:font script="Orya" typeface="Kalinga"/>
+        <a:font script="Mlym" typeface="Kartika"/>
+        <a:font script="Laoo" typeface="DokChampa"/>
+        <a:font script="Sinh" typeface="Iskoola Pota"/>
+        <a:font script="Mong" typeface="Mongolian Baiti"/>
+        <a:font script="Viet" typeface="Times New Roman"/>
+        <a:font script="Uigh" typeface="Microsoft Uighur"/>
+        <a:font script="Geor" typeface="Sylfaen"/>
+        <a:font script="Armn" typeface="Arial"/>
+        <a:font script="Bugi" typeface="Leelawadee UI"/>
+        <a:font script="Bopo" typeface="Microsoft JhengHei"/>
+        <a:font script="Java" typeface="Javanese Text"/>
+        <a:font script="Lisu" typeface="Segoe UI"/>
+        <a:font script="Mymr" typeface="Myanmar Text"/>
+        <a:font script="Nkoo" typeface="Ebrima"/>
+        <a:font script="Olck" typeface="Nirmala UI"/>
+        <a:font script="Osma" typeface="Ebrima"/>
+        <a:font script="Phag" typeface="Phagspa"/>
+        <a:font script="Syrn" typeface="Estrangelo Edessa"/>
+        <a:font script="Syrj" typeface="Estrangelo Edessa"/>
+        <a:font script="Syre" typeface="Estrangelo Edessa"/>
+        <a:font script="Sora" typeface="Nirmala UI"/>
+        <a:font script="Tale" typeface="Microsoft Tai Le"/>
+        <a:font script="Talu" typeface="Microsoft New Tai Lue"/>
+        <a:font script="Tfng" typeface="Ebrima"/>
+      </a:majorFont>
+      <a:minorFont>
+        <a:latin typeface="游ゴシック" panose="02110004020202020204"/>
+        <a:ea typeface=""/>
+        <a:cs typeface=""/>
+        <a:font script="Jpan" typeface="游ゴシック"/>
+        <a:font script="Hang" typeface="맑은 고딕"/>
+        <a:font script="Hans" typeface="等线"/>
+        <a:font script="Hant" typeface="新細明體"/>
+        <a:font script="Arab" typeface="Arial"/>
+        <a:font script="Hebr" typeface="Arial"/>
+        <a:font script="Thai" typeface="Cordia New"/>
+        <a:font script="Ethi" typeface="Nyala"/>
+        <a:font script="Beng" typeface="Vrinda"/>
+        <a:font script="Gujr" typeface="Shruti"/>
+        <a:font script="Khmr" typeface="DaunPenh"/>
+        <a:font script="Knda" typeface="Tunga"/>
+        <a:font script="Guru" typeface="Raavi"/>
+        <a:font script="Cans" typeface="Euphemia"/>
+        <a:font script="Cher" typeface="Plantagenet Cherokee"/>
+        <a:font script="Yiii" typeface="Microsoft Yi Baiti"/>
+        <a:font script="Tibt" typeface="Microsoft Himalaya"/>
+        <a:font script="Thaa" typeface="MV Boli"/>
+        <a:font script="Deva" typeface="Mangal"/>
+        <a:font script="Telu" typeface="Gautami"/>
+        <a:font script="Taml" typeface="Latha"/>
+        <a:font script="Syrc" typeface="Estrangelo Edessa"/>
+        <a:font script="Orya" typeface="Kalinga"/>
+        <a:font script="Mlym" typeface="Kartika"/>
+        <a:font script="Laoo" typeface="DokChampa"/>
+        <a:font script="Sinh" typeface="Iskoola Pota"/>
+        <a:font script="Mong" typeface="Mongolian Baiti"/>
+        <a:font script="Viet" typeface="Arial"/>
+        <a:font script="Uigh" typeface="Microsoft Uighur"/>
+        <a:font script="Geor" typeface="Sylfaen"/>
+        <a:font script="Armn" typeface="Arial"/>
+        <a:font script="Bugi" typeface="Leelawadee UI"/>
+        <a:font script="Bopo" typeface="Microsoft JhengHei"/>
+        <a:font script="Java" typeface="Javanese Text"/>
+        <a:font script="Lisu" typeface="Segoe UI"/>
+        <a:font script="Mymr" typeface="Myanmar Text"/>
+        <a:font script="Nkoo" typeface="Ebrima"/>
+        <a:font script="Olck" typeface="Nirmala UI"/>
+        <a:font script="Osma" typeface="Ebrima"/>
+        <a:font script="Phag" typeface="Phagspa"/>
+        <a:font script="Syrn" typeface="Estrangelo Edessa"/>
+        <a:font script="Syrj" typeface="Estrangelo Edessa"/>
+        <a:font script="Syre" typeface="Estrangelo Edessa"/>
+        <a:font script="Sora" typeface="Nirmala UI"/>
+        <a:font script="Tale" typeface="Microsoft Tai Le"/>
+        <a:font script="Talu" typeface="Microsoft New Tai Lue"/>
+        <a:font script="Tfng" typeface="Ebrima"/>
+      </a:minorFont>
+    </a:fontScheme>
+    <a:fmtScheme name="Office">
+      <a:fillStyleLst>
+        <a:solidFill>
+          <a:schemeClr val="phClr"/>
+        </a:solidFill>
+        <a:gradFill rotWithShape="1">
+          <a:gsLst>
+            <a:gs pos="0">
+              <a:schemeClr val="phClr">
+                <a:lumMod val="110000"/>
+                <a:satMod val="105000"/>
+                <a:tint val="67000"/>
+              </a:schemeClr>
+            </a:gs>
+            <a:gs pos="50000">
+              <a:schemeClr val="phClr">
+                <a:lumMod val="105000"/>
+                <a:satMod val="103000"/>
+                <a:tint val="73000"/>
+              </a:schemeClr>
+            </a:gs>
+            <a:gs pos="100000">
+              <a:schemeClr val="phClr">
+                <a:lumMod val="105000"/>
+                <a:satMod val="109000"/>
+                <a:tint val="81000"/>
+              </a:schemeClr>
+            </a:gs>
+          </a:gsLst>
+          <a:lin ang="5400000" scaled="0"/>
+        </a:gradFill>
+        <a:gradFill rotWithShape="1">
+          <a:gsLst>
+            <a:gs pos="0">
+              <a:schemeClr val="phClr">
+                <a:satMod val="103000"/>
+                <a:lumMod val="102000"/>
+                <a:tint val="94000"/>
+              </a:schemeClr>
+            </a:gs>
+            <a:gs pos="50000">
+              <a:schemeClr val="phClr">
+                <a:satMod val="110000"/>
+                <a:lumMod val="100000"/>
+                <a:shade val="100000"/>
+              </a:schemeClr>
+            </a:gs>
+            <a:gs pos="100000">
+              <a:schemeClr val="phClr">
+                <a:lumMod val="99000"/>
+                <a:satMod val="120000"/>
+                <a:shade val="78000"/>
+              </a:schemeClr>
+            </a:gs>
+          </a:gsLst>
+          <a:lin ang="5400000" scaled="0"/>
+        </a:gradFill>
+      </a:fillStyleLst>
+      <a:lnStyleLst>
+        <a:ln w="12700" cap="flat" cmpd="sng" algn="ctr">
+          <a:solidFill>
+            <a:schemeClr val="phClr"/>
+          </a:solidFill>
+          <a:prstDash val="solid"/>
+          <a:miter lim="800000"/>
+        </a:ln>
+        <a:ln w="19050" cap="flat" cmpd="sng" algn="ctr">
+          <a:solidFill>
+            <a:schemeClr val="phClr"/>
+          </a:solidFill>
+          <a:prstDash val="solid"/>
+          <a:miter lim="800000"/>
+        </a:ln>
+        <a:ln w="25400" cap="flat" cmpd="sng" algn="ctr">
+          <a:solidFill>
+            <a:schemeClr val="phClr"/>
+          </a:solidFill>
+          <a:prstDash val="solid"/>
+          <a:miter lim="800000"/>
+        </a:ln>
+      </a:lnStyleLst>
+      <a:effectStyleLst>
+        <a:effectStyle>
+          <a:effectLst/>
+        </a:effectStyle>
+        <a:effectStyle>
+          <a:effectLst/>
+        </a:effectStyle>
+        <a:effectStyle>
+          <a:effectLst>
+            <a:outerShdw blurRad="57150" dist="19050" dir="5400000" algn="ctr" rotWithShape="0">
+              <a:srgbClr val="000000">
+                <a:alpha val="63000"/>
+              </a:srgbClr>
+            </a:outerShdw>
+          </a:effectLst>
+        </a:effectStyle>
+      </a:effectStyleLst>
+      <a:bgFillStyleLst>
+        <a:solidFill>
+          <a:schemeClr val="phClr"/>
+        </a:solidFill>
+        <a:solidFill>
+          <a:schemeClr val="phClr">
+            <a:tint val="95000"/>
+            <a:satMod val="170000"/>
+          </a:schemeClr>
+        </a:solidFill>
+        <a:gradFill rotWithShape="1">
+          <a:gsLst>
+            <a:gs pos="0">
+              <a:schemeClr val="phClr">
+                <a:tint val="93000"/>
+                <a:satMod val="150000"/>
+                <a:shade val="98000"/>
+                <a:lumMod val="102000"/>
+              </a:schemeClr>
+            </a:gs>
+            <a:gs pos="50000">
+              <a:schemeClr val="phClr">
+                <a:tint val="98000"/>
+                <a:satMod val="130000"/>
+                <a:shade val="90000"/>
+                <a:lumMod val="103000"/>
+              </a:schemeClr>
+            </a:gs>
+            <a:gs pos="100000">
+              <a:schemeClr val="phClr">
+                <a:shade val="63000"/>
+                <a:satMod val="120000"/>
+              </a:schemeClr>
+            </a:gs>
+          </a:gsLst>
+          <a:lin ang="5400000" scaled="0"/>
+        </a:gradFill>
+      </a:bgFillStyleLst>
+    </a:fmtScheme>
+  </a:themeElements>
+  <a:objectDefaults>
+    <a:lnDef>
+      <a:spPr/>
+      <a:bodyPr/>
+      <a:lstStyle/>
+      <a:style>
+        <a:lnRef idx="2">
+          <a:schemeClr val="accent1"/>
+        </a:lnRef>
+        <a:fillRef idx="0">
+          <a:schemeClr val="accent1"/>
+        </a:fillRef>
+        <a:effectRef idx="1">
+          <a:schemeClr val="accent1"/>
+        </a:effectRef>
+        <a:fontRef idx="minor">
+          <a:schemeClr val="tx1"/>
+        </a:fontRef>
+      </a:style>
+    </a:lnDef>
+  </a:objectDefaults>
+  <a:extraClrSchemeLst/>
+  <a:extLst>
+    <a:ext uri="{05A4C25C-085E-4340-85A3-A5531E510DB2}">
+      <thm15:themeFamily xmlns:thm15="http://schemas.microsoft.com/office/thememl/2012/main" name="Office Theme" id="{2E142A2C-CD16-42D6-873A-C26D2A0506FA}" vid="{1BDDFF52-6CD6-40A5-AB3C-68EB2F1E4D0A}"/>
+    </a:ext>
+  </a:extLst>
+</a:theme>
 </file>
</xml_diff>